<commit_message>
renamed iss3 to development
</commit_message>
<xml_diff>
--- a/documentatie/need4LabControl/IntroLabControl.pptx
+++ b/documentatie/need4LabControl/IntroLabControl.pptx
@@ -267,7 +267,7 @@
           <a:p>
             <a:fld id="{571CEB8F-B2D3-4602-B193-BC06AF1D60B6}" type="datetimeFigureOut">
               <a:rPr lang="nl-NL" smtClean="0"/>
-              <a:t>5-2-2025</a:t>
+              <a:t>14-2-2025</a:t>
             </a:fld>
             <a:endParaRPr lang="nl-NL"/>
           </a:p>
@@ -465,7 +465,7 @@
           <a:p>
             <a:fld id="{571CEB8F-B2D3-4602-B193-BC06AF1D60B6}" type="datetimeFigureOut">
               <a:rPr lang="nl-NL" smtClean="0"/>
-              <a:t>5-2-2025</a:t>
+              <a:t>14-2-2025</a:t>
             </a:fld>
             <a:endParaRPr lang="nl-NL"/>
           </a:p>
@@ -673,7 +673,7 @@
           <a:p>
             <a:fld id="{571CEB8F-B2D3-4602-B193-BC06AF1D60B6}" type="datetimeFigureOut">
               <a:rPr lang="nl-NL" smtClean="0"/>
-              <a:t>5-2-2025</a:t>
+              <a:t>14-2-2025</a:t>
             </a:fld>
             <a:endParaRPr lang="nl-NL"/>
           </a:p>
@@ -871,7 +871,7 @@
           <a:p>
             <a:fld id="{571CEB8F-B2D3-4602-B193-BC06AF1D60B6}" type="datetimeFigureOut">
               <a:rPr lang="nl-NL" smtClean="0"/>
-              <a:t>5-2-2025</a:t>
+              <a:t>14-2-2025</a:t>
             </a:fld>
             <a:endParaRPr lang="nl-NL"/>
           </a:p>
@@ -1146,7 +1146,7 @@
           <a:p>
             <a:fld id="{571CEB8F-B2D3-4602-B193-BC06AF1D60B6}" type="datetimeFigureOut">
               <a:rPr lang="nl-NL" smtClean="0"/>
-              <a:t>5-2-2025</a:t>
+              <a:t>14-2-2025</a:t>
             </a:fld>
             <a:endParaRPr lang="nl-NL"/>
           </a:p>
@@ -1411,7 +1411,7 @@
           <a:p>
             <a:fld id="{571CEB8F-B2D3-4602-B193-BC06AF1D60B6}" type="datetimeFigureOut">
               <a:rPr lang="nl-NL" smtClean="0"/>
-              <a:t>5-2-2025</a:t>
+              <a:t>14-2-2025</a:t>
             </a:fld>
             <a:endParaRPr lang="nl-NL"/>
           </a:p>
@@ -1823,7 +1823,7 @@
           <a:p>
             <a:fld id="{571CEB8F-B2D3-4602-B193-BC06AF1D60B6}" type="datetimeFigureOut">
               <a:rPr lang="nl-NL" smtClean="0"/>
-              <a:t>5-2-2025</a:t>
+              <a:t>14-2-2025</a:t>
             </a:fld>
             <a:endParaRPr lang="nl-NL"/>
           </a:p>
@@ -1964,7 +1964,7 @@
           <a:p>
             <a:fld id="{571CEB8F-B2D3-4602-B193-BC06AF1D60B6}" type="datetimeFigureOut">
               <a:rPr lang="nl-NL" smtClean="0"/>
-              <a:t>5-2-2025</a:t>
+              <a:t>14-2-2025</a:t>
             </a:fld>
             <a:endParaRPr lang="nl-NL"/>
           </a:p>
@@ -2077,7 +2077,7 @@
           <a:p>
             <a:fld id="{571CEB8F-B2D3-4602-B193-BC06AF1D60B6}" type="datetimeFigureOut">
               <a:rPr lang="nl-NL" smtClean="0"/>
-              <a:t>5-2-2025</a:t>
+              <a:t>14-2-2025</a:t>
             </a:fld>
             <a:endParaRPr lang="nl-NL"/>
           </a:p>
@@ -2388,7 +2388,7 @@
           <a:p>
             <a:fld id="{571CEB8F-B2D3-4602-B193-BC06AF1D60B6}" type="datetimeFigureOut">
               <a:rPr lang="nl-NL" smtClean="0"/>
-              <a:t>5-2-2025</a:t>
+              <a:t>14-2-2025</a:t>
             </a:fld>
             <a:endParaRPr lang="nl-NL"/>
           </a:p>
@@ -2676,7 +2676,7 @@
           <a:p>
             <a:fld id="{571CEB8F-B2D3-4602-B193-BC06AF1D60B6}" type="datetimeFigureOut">
               <a:rPr lang="nl-NL" smtClean="0"/>
-              <a:t>5-2-2025</a:t>
+              <a:t>14-2-2025</a:t>
             </a:fld>
             <a:endParaRPr lang="nl-NL"/>
           </a:p>
@@ -2917,7 +2917,7 @@
           <a:p>
             <a:fld id="{571CEB8F-B2D3-4602-B193-BC06AF1D60B6}" type="datetimeFigureOut">
               <a:rPr lang="nl-NL" smtClean="0"/>
-              <a:t>5-2-2025</a:t>
+              <a:t>14-2-2025</a:t>
             </a:fld>
             <a:endParaRPr lang="nl-NL"/>
           </a:p>
@@ -5291,7 +5291,10 @@
           <a:bodyPr/>
           <a:lstStyle/>
           <a:p>
-            <a:endParaRPr lang="nl-NL"/>
+            <a:r>
+              <a:rPr lang="nl-NL" dirty="0"/>
+              <a:t>=</a:t>
+            </a:r>
           </a:p>
         </p:txBody>
       </p:sp>

</xml_diff>

<commit_message>
add some OWON awg pdf docs
</commit_message>
<xml_diff>
--- a/documentatie/need4LabControl/IntroLabControl.pptx
+++ b/documentatie/need4LabControl/IntroLabControl.pptx
@@ -267,7 +267,7 @@
           <a:p>
             <a:fld id="{571CEB8F-B2D3-4602-B193-BC06AF1D60B6}" type="datetimeFigureOut">
               <a:rPr lang="nl-NL" smtClean="0"/>
-              <a:t>14-2-2025</a:t>
+              <a:t>16-2-2025</a:t>
             </a:fld>
             <a:endParaRPr lang="nl-NL"/>
           </a:p>
@@ -465,7 +465,7 @@
           <a:p>
             <a:fld id="{571CEB8F-B2D3-4602-B193-BC06AF1D60B6}" type="datetimeFigureOut">
               <a:rPr lang="nl-NL" smtClean="0"/>
-              <a:t>14-2-2025</a:t>
+              <a:t>16-2-2025</a:t>
             </a:fld>
             <a:endParaRPr lang="nl-NL"/>
           </a:p>
@@ -673,7 +673,7 @@
           <a:p>
             <a:fld id="{571CEB8F-B2D3-4602-B193-BC06AF1D60B6}" type="datetimeFigureOut">
               <a:rPr lang="nl-NL" smtClean="0"/>
-              <a:t>14-2-2025</a:t>
+              <a:t>16-2-2025</a:t>
             </a:fld>
             <a:endParaRPr lang="nl-NL"/>
           </a:p>
@@ -871,7 +871,7 @@
           <a:p>
             <a:fld id="{571CEB8F-B2D3-4602-B193-BC06AF1D60B6}" type="datetimeFigureOut">
               <a:rPr lang="nl-NL" smtClean="0"/>
-              <a:t>14-2-2025</a:t>
+              <a:t>16-2-2025</a:t>
             </a:fld>
             <a:endParaRPr lang="nl-NL"/>
           </a:p>
@@ -1146,7 +1146,7 @@
           <a:p>
             <a:fld id="{571CEB8F-B2D3-4602-B193-BC06AF1D60B6}" type="datetimeFigureOut">
               <a:rPr lang="nl-NL" smtClean="0"/>
-              <a:t>14-2-2025</a:t>
+              <a:t>16-2-2025</a:t>
             </a:fld>
             <a:endParaRPr lang="nl-NL"/>
           </a:p>
@@ -1411,7 +1411,7 @@
           <a:p>
             <a:fld id="{571CEB8F-B2D3-4602-B193-BC06AF1D60B6}" type="datetimeFigureOut">
               <a:rPr lang="nl-NL" smtClean="0"/>
-              <a:t>14-2-2025</a:t>
+              <a:t>16-2-2025</a:t>
             </a:fld>
             <a:endParaRPr lang="nl-NL"/>
           </a:p>
@@ -1823,7 +1823,7 @@
           <a:p>
             <a:fld id="{571CEB8F-B2D3-4602-B193-BC06AF1D60B6}" type="datetimeFigureOut">
               <a:rPr lang="nl-NL" smtClean="0"/>
-              <a:t>14-2-2025</a:t>
+              <a:t>16-2-2025</a:t>
             </a:fld>
             <a:endParaRPr lang="nl-NL"/>
           </a:p>
@@ -1964,7 +1964,7 @@
           <a:p>
             <a:fld id="{571CEB8F-B2D3-4602-B193-BC06AF1D60B6}" type="datetimeFigureOut">
               <a:rPr lang="nl-NL" smtClean="0"/>
-              <a:t>14-2-2025</a:t>
+              <a:t>16-2-2025</a:t>
             </a:fld>
             <a:endParaRPr lang="nl-NL"/>
           </a:p>
@@ -2077,7 +2077,7 @@
           <a:p>
             <a:fld id="{571CEB8F-B2D3-4602-B193-BC06AF1D60B6}" type="datetimeFigureOut">
               <a:rPr lang="nl-NL" smtClean="0"/>
-              <a:t>14-2-2025</a:t>
+              <a:t>16-2-2025</a:t>
             </a:fld>
             <a:endParaRPr lang="nl-NL"/>
           </a:p>
@@ -2388,7 +2388,7 @@
           <a:p>
             <a:fld id="{571CEB8F-B2D3-4602-B193-BC06AF1D60B6}" type="datetimeFigureOut">
               <a:rPr lang="nl-NL" smtClean="0"/>
-              <a:t>14-2-2025</a:t>
+              <a:t>16-2-2025</a:t>
             </a:fld>
             <a:endParaRPr lang="nl-NL"/>
           </a:p>
@@ -2676,7 +2676,7 @@
           <a:p>
             <a:fld id="{571CEB8F-B2D3-4602-B193-BC06AF1D60B6}" type="datetimeFigureOut">
               <a:rPr lang="nl-NL" smtClean="0"/>
-              <a:t>14-2-2025</a:t>
+              <a:t>16-2-2025</a:t>
             </a:fld>
             <a:endParaRPr lang="nl-NL"/>
           </a:p>
@@ -2917,7 +2917,7 @@
           <a:p>
             <a:fld id="{571CEB8F-B2D3-4602-B193-BC06AF1D60B6}" type="datetimeFigureOut">
               <a:rPr lang="nl-NL" smtClean="0"/>
-              <a:t>14-2-2025</a:t>
+              <a:t>16-2-2025</a:t>
             </a:fld>
             <a:endParaRPr lang="nl-NL"/>
           </a:p>
@@ -4746,8 +4746,8 @@
           <p:nvPr/>
         </p:nvSpPr>
         <p:spPr>
-          <a:xfrm rot="19441182">
-            <a:off x="5458943" y="3963615"/>
+          <a:xfrm rot="15920045">
+            <a:off x="6762765" y="4202115"/>
             <a:ext cx="1544498" cy="240547"/>
           </a:xfrm>
           <a:prstGeom prst="rightArrow">
@@ -4795,8 +4795,8 @@
           <p:nvPr/>
         </p:nvSpPr>
         <p:spPr>
-          <a:xfrm rot="17067579">
-            <a:off x="6852666" y="4107508"/>
+          <a:xfrm rot="13587902">
+            <a:off x="7874642" y="3926198"/>
             <a:ext cx="1544498" cy="240547"/>
           </a:xfrm>
           <a:prstGeom prst="rightArrow">
@@ -4845,8 +4845,8 @@
         </p:nvSpPr>
         <p:spPr>
           <a:xfrm>
-            <a:off x="6096000" y="5061260"/>
-            <a:ext cx="6096000" cy="369332"/>
+            <a:off x="7932089" y="4715716"/>
+            <a:ext cx="2485140" cy="369332"/>
           </a:xfrm>
           <a:prstGeom prst="rect">
             <a:avLst/>
@@ -4881,7 +4881,7 @@
         </p:nvSpPr>
         <p:spPr>
           <a:xfrm>
-            <a:off x="10225548" y="5126498"/>
+            <a:off x="10686336" y="5177250"/>
             <a:ext cx="1717190" cy="369332"/>
           </a:xfrm>
           <a:prstGeom prst="rect">
@@ -4915,8 +4915,8 @@
           <p:nvPr/>
         </p:nvSpPr>
         <p:spPr>
-          <a:xfrm rot="16200000">
-            <a:off x="9956934" y="4284727"/>
+          <a:xfrm rot="14982700">
+            <a:off x="10307809" y="4229068"/>
             <a:ext cx="1544498" cy="240547"/>
           </a:xfrm>
           <a:prstGeom prst="rightArrow">
@@ -4948,6 +4948,49 @@
           <a:p>
             <a:pPr algn="ctr"/>
             <a:endParaRPr lang="nl-NL"/>
+          </a:p>
+        </p:txBody>
+      </p:sp>
+      <p:sp>
+        <p:nvSpPr>
+          <p:cNvPr id="3" name="Tekstvak 2">
+            <a:extLst>
+              <a:ext uri="{FF2B5EF4-FFF2-40B4-BE49-F238E27FC236}">
+                <a16:creationId xmlns:a16="http://schemas.microsoft.com/office/drawing/2014/main" id="{76981F18-4859-C778-4FCD-D190CA8E1C78}"/>
+              </a:ext>
+            </a:extLst>
+          </p:cNvPr>
+          <p:cNvSpPr txBox="1"/>
+          <p:nvPr/>
+        </p:nvSpPr>
+        <p:spPr>
+          <a:xfrm>
+            <a:off x="6869716" y="5189805"/>
+            <a:ext cx="2485140" cy="646331"/>
+          </a:xfrm>
+          <a:prstGeom prst="rect">
+            <a:avLst/>
+          </a:prstGeom>
+          <a:noFill/>
+        </p:spPr>
+        <p:txBody>
+          <a:bodyPr wrap="square">
+            <a:spAutoFit/>
+          </a:bodyPr>
+          <a:lstStyle/>
+          <a:p>
+            <a:pPr lvl="1"/>
+            <a:r>
+              <a:rPr lang="nl-NL" dirty="0"/>
+              <a:t>Netwerk </a:t>
+            </a:r>
+          </a:p>
+          <a:p>
+            <a:pPr lvl="1"/>
+            <a:r>
+              <a:rPr lang="nl-NL" dirty="0"/>
+              <a:t>aansluiting</a:t>
+            </a:r>
           </a:p>
         </p:txBody>
       </p:sp>

</xml_diff>